<commit_message>
FILNAL prod and dev file added env created
</commit_message>
<xml_diff>
--- a/Tutus Funn/Notes Project structure.pptx
+++ b/Tutus Funn/Notes Project structure.pptx
@@ -7,6 +7,10 @@
   <p:sldIdLst>
     <p:sldId id="257" r:id="rId2"/>
     <p:sldId id="258" r:id="rId3"/>
+    <p:sldId id="259" r:id="rId4"/>
+    <p:sldId id="260" r:id="rId5"/>
+    <p:sldId id="261" r:id="rId6"/>
+    <p:sldId id="262" r:id="rId7"/>
   </p:sldIdLst>
   <p:sldSz cx="12636500" cy="7235825"/>
   <p:notesSz cx="9144000" cy="6858000"/>
@@ -105,6 +109,11 @@
       </a:defRPr>
     </a:lvl9pPr>
   </p:defaultTextStyle>
+  <p:extLst>
+    <p:ext uri="{EFAFB233-063F-42B5-8137-9DF3F51BA10A}">
+      <p15:sldGuideLst xmlns:p15="http://schemas.microsoft.com/office/powerpoint/2012/main"/>
+    </p:ext>
+  </p:extLst>
 </p:presentation>
 </file>
 
@@ -239,7 +248,7 @@
           <a:p>
             <a:fld id="{FE144231-2570-4C76-92C7-FA895B8390C7}" type="datetimeFigureOut">
               <a:rPr lang="en-IN" smtClean="0"/>
-              <a:t>01-09-2024</a:t>
+              <a:t>04-09-2024</a:t>
             </a:fld>
             <a:endParaRPr lang="en-IN"/>
           </a:p>
@@ -409,7 +418,7 @@
           <a:p>
             <a:fld id="{FE144231-2570-4C76-92C7-FA895B8390C7}" type="datetimeFigureOut">
               <a:rPr lang="en-IN" smtClean="0"/>
-              <a:t>01-09-2024</a:t>
+              <a:t>04-09-2024</a:t>
             </a:fld>
             <a:endParaRPr lang="en-IN"/>
           </a:p>
@@ -589,7 +598,7 @@
           <a:p>
             <a:fld id="{FE144231-2570-4C76-92C7-FA895B8390C7}" type="datetimeFigureOut">
               <a:rPr lang="en-IN" smtClean="0"/>
-              <a:t>01-09-2024</a:t>
+              <a:t>04-09-2024</a:t>
             </a:fld>
             <a:endParaRPr lang="en-IN"/>
           </a:p>
@@ -759,7 +768,7 @@
           <a:p>
             <a:fld id="{FE144231-2570-4C76-92C7-FA895B8390C7}" type="datetimeFigureOut">
               <a:rPr lang="en-IN" smtClean="0"/>
-              <a:t>01-09-2024</a:t>
+              <a:t>04-09-2024</a:t>
             </a:fld>
             <a:endParaRPr lang="en-IN"/>
           </a:p>
@@ -1005,7 +1014,7 @@
           <a:p>
             <a:fld id="{FE144231-2570-4C76-92C7-FA895B8390C7}" type="datetimeFigureOut">
               <a:rPr lang="en-IN" smtClean="0"/>
-              <a:t>01-09-2024</a:t>
+              <a:t>04-09-2024</a:t>
             </a:fld>
             <a:endParaRPr lang="en-IN"/>
           </a:p>
@@ -1237,7 +1246,7 @@
           <a:p>
             <a:fld id="{FE144231-2570-4C76-92C7-FA895B8390C7}" type="datetimeFigureOut">
               <a:rPr lang="en-IN" smtClean="0"/>
-              <a:t>01-09-2024</a:t>
+              <a:t>04-09-2024</a:t>
             </a:fld>
             <a:endParaRPr lang="en-IN"/>
           </a:p>
@@ -1604,7 +1613,7 @@
           <a:p>
             <a:fld id="{FE144231-2570-4C76-92C7-FA895B8390C7}" type="datetimeFigureOut">
               <a:rPr lang="en-IN" smtClean="0"/>
-              <a:t>01-09-2024</a:t>
+              <a:t>04-09-2024</a:t>
             </a:fld>
             <a:endParaRPr lang="en-IN"/>
           </a:p>
@@ -1722,7 +1731,7 @@
           <a:p>
             <a:fld id="{FE144231-2570-4C76-92C7-FA895B8390C7}" type="datetimeFigureOut">
               <a:rPr lang="en-IN" smtClean="0"/>
-              <a:t>01-09-2024</a:t>
+              <a:t>04-09-2024</a:t>
             </a:fld>
             <a:endParaRPr lang="en-IN"/>
           </a:p>
@@ -1817,7 +1826,7 @@
           <a:p>
             <a:fld id="{FE144231-2570-4C76-92C7-FA895B8390C7}" type="datetimeFigureOut">
               <a:rPr lang="en-IN" smtClean="0"/>
-              <a:t>01-09-2024</a:t>
+              <a:t>04-09-2024</a:t>
             </a:fld>
             <a:endParaRPr lang="en-IN"/>
           </a:p>
@@ -2094,7 +2103,7 @@
           <a:p>
             <a:fld id="{FE144231-2570-4C76-92C7-FA895B8390C7}" type="datetimeFigureOut">
               <a:rPr lang="en-IN" smtClean="0"/>
-              <a:t>01-09-2024</a:t>
+              <a:t>04-09-2024</a:t>
             </a:fld>
             <a:endParaRPr lang="en-IN"/>
           </a:p>
@@ -2351,7 +2360,7 @@
           <a:p>
             <a:fld id="{FE144231-2570-4C76-92C7-FA895B8390C7}" type="datetimeFigureOut">
               <a:rPr lang="en-IN" smtClean="0"/>
-              <a:t>01-09-2024</a:t>
+              <a:t>04-09-2024</a:t>
             </a:fld>
             <a:endParaRPr lang="en-IN"/>
           </a:p>
@@ -2564,7 +2573,7 @@
           <a:p>
             <a:fld id="{FE144231-2570-4C76-92C7-FA895B8390C7}" type="datetimeFigureOut">
               <a:rPr lang="en-IN" smtClean="0"/>
-              <a:t>01-09-2024</a:t>
+              <a:t>04-09-2024</a:t>
             </a:fld>
             <a:endParaRPr lang="en-IN"/>
           </a:p>
@@ -3153,6 +3162,246 @@
 </p:sld>
 </file>
 
+<file path=ppt/slides/slide3.xml><?xml version="1.0" encoding="utf-8"?>
+<p:sld xmlns:a="http://schemas.openxmlformats.org/drawingml/2006/main" xmlns:r="http://schemas.openxmlformats.org/officeDocument/2006/relationships" xmlns:p="http://schemas.openxmlformats.org/presentationml/2006/main">
+  <p:cSld>
+    <p:spTree>
+      <p:nvGrpSpPr>
+        <p:cNvPr id="1" name=""/>
+        <p:cNvGrpSpPr/>
+        <p:nvPr/>
+      </p:nvGrpSpPr>
+      <p:grpSpPr>
+        <a:xfrm>
+          <a:off x="0" y="0"/>
+          <a:ext cx="0" cy="0"/>
+          <a:chOff x="0" y="0"/>
+          <a:chExt cx="0" cy="0"/>
+        </a:xfrm>
+      </p:grpSpPr>
+      <p:pic>
+        <p:nvPicPr>
+          <p:cNvPr id="2" name="Picture 1"/>
+          <p:cNvPicPr>
+            <a:picLocks noChangeAspect="1"/>
+          </p:cNvPicPr>
+          <p:nvPr/>
+        </p:nvPicPr>
+        <p:blipFill>
+          <a:blip r:embed="rId2"/>
+          <a:stretch>
+            <a:fillRect/>
+          </a:stretch>
+        </p:blipFill>
+        <p:spPr>
+          <a:xfrm>
+            <a:off x="-187325" y="-39688"/>
+            <a:ext cx="13011150" cy="7315200"/>
+          </a:xfrm>
+          <a:prstGeom prst="rect">
+            <a:avLst/>
+          </a:prstGeom>
+        </p:spPr>
+      </p:pic>
+    </p:spTree>
+    <p:extLst>
+      <p:ext uri="{BB962C8B-B14F-4D97-AF65-F5344CB8AC3E}">
+        <p14:creationId xmlns:p14="http://schemas.microsoft.com/office/powerpoint/2010/main" val="2550715644"/>
+      </p:ext>
+    </p:extLst>
+  </p:cSld>
+  <p:clrMapOvr>
+    <a:masterClrMapping/>
+  </p:clrMapOvr>
+</p:sld>
+</file>
+
+<file path=ppt/slides/slide4.xml><?xml version="1.0" encoding="utf-8"?>
+<p:sld xmlns:a="http://schemas.openxmlformats.org/drawingml/2006/main" xmlns:r="http://schemas.openxmlformats.org/officeDocument/2006/relationships" xmlns:p="http://schemas.openxmlformats.org/presentationml/2006/main">
+  <p:cSld>
+    <p:spTree>
+      <p:nvGrpSpPr>
+        <p:cNvPr id="1" name=""/>
+        <p:cNvGrpSpPr/>
+        <p:nvPr/>
+      </p:nvGrpSpPr>
+      <p:grpSpPr>
+        <a:xfrm>
+          <a:off x="0" y="0"/>
+          <a:ext cx="0" cy="0"/>
+          <a:chOff x="0" y="0"/>
+          <a:chExt cx="0" cy="0"/>
+        </a:xfrm>
+      </p:grpSpPr>
+      <p:pic>
+        <p:nvPicPr>
+          <p:cNvPr id="2" name="Picture 1"/>
+          <p:cNvPicPr>
+            <a:picLocks noChangeAspect="1"/>
+          </p:cNvPicPr>
+          <p:nvPr/>
+        </p:nvPicPr>
+        <p:blipFill>
+          <a:blip r:embed="rId2"/>
+          <a:stretch>
+            <a:fillRect/>
+          </a:stretch>
+        </p:blipFill>
+        <p:spPr>
+          <a:xfrm>
+            <a:off x="-187325" y="-39688"/>
+            <a:ext cx="13011150" cy="7315200"/>
+          </a:xfrm>
+          <a:prstGeom prst="rect">
+            <a:avLst/>
+          </a:prstGeom>
+        </p:spPr>
+      </p:pic>
+    </p:spTree>
+    <p:extLst>
+      <p:ext uri="{BB962C8B-B14F-4D97-AF65-F5344CB8AC3E}">
+        <p14:creationId xmlns:p14="http://schemas.microsoft.com/office/powerpoint/2010/main" val="228572010"/>
+      </p:ext>
+    </p:extLst>
+  </p:cSld>
+  <p:clrMapOvr>
+    <a:masterClrMapping/>
+  </p:clrMapOvr>
+</p:sld>
+</file>
+
+<file path=ppt/slides/slide5.xml><?xml version="1.0" encoding="utf-8"?>
+<p:sld xmlns:a="http://schemas.openxmlformats.org/drawingml/2006/main" xmlns:r="http://schemas.openxmlformats.org/officeDocument/2006/relationships" xmlns:p="http://schemas.openxmlformats.org/presentationml/2006/main">
+  <p:cSld>
+    <p:spTree>
+      <p:nvGrpSpPr>
+        <p:cNvPr id="1" name=""/>
+        <p:cNvGrpSpPr/>
+        <p:nvPr/>
+      </p:nvGrpSpPr>
+      <p:grpSpPr>
+        <a:xfrm>
+          <a:off x="0" y="0"/>
+          <a:ext cx="0" cy="0"/>
+          <a:chOff x="0" y="0"/>
+          <a:chExt cx="0" cy="0"/>
+        </a:xfrm>
+      </p:grpSpPr>
+      <p:pic>
+        <p:nvPicPr>
+          <p:cNvPr id="2" name="Picture 1"/>
+          <p:cNvPicPr>
+            <a:picLocks noChangeAspect="1"/>
+          </p:cNvPicPr>
+          <p:nvPr/>
+        </p:nvPicPr>
+        <p:blipFill>
+          <a:blip r:embed="rId2"/>
+          <a:stretch>
+            <a:fillRect/>
+          </a:stretch>
+        </p:blipFill>
+        <p:spPr>
+          <a:xfrm>
+            <a:off x="-187325" y="-39688"/>
+            <a:ext cx="13011150" cy="7315200"/>
+          </a:xfrm>
+          <a:prstGeom prst="rect">
+            <a:avLst/>
+          </a:prstGeom>
+        </p:spPr>
+      </p:pic>
+    </p:spTree>
+    <p:extLst>
+      <p:ext uri="{BB962C8B-B14F-4D97-AF65-F5344CB8AC3E}">
+        <p14:creationId xmlns:p14="http://schemas.microsoft.com/office/powerpoint/2010/main" val="652472755"/>
+      </p:ext>
+    </p:extLst>
+  </p:cSld>
+  <p:clrMapOvr>
+    <a:masterClrMapping/>
+  </p:clrMapOvr>
+</p:sld>
+</file>
+
+<file path=ppt/slides/slide6.xml><?xml version="1.0" encoding="utf-8"?>
+<p:sld xmlns:a="http://schemas.openxmlformats.org/drawingml/2006/main" xmlns:r="http://schemas.openxmlformats.org/officeDocument/2006/relationships" xmlns:p="http://schemas.openxmlformats.org/presentationml/2006/main">
+  <p:cSld>
+    <p:spTree>
+      <p:nvGrpSpPr>
+        <p:cNvPr id="1" name=""/>
+        <p:cNvGrpSpPr/>
+        <p:nvPr/>
+      </p:nvGrpSpPr>
+      <p:grpSpPr>
+        <a:xfrm>
+          <a:off x="0" y="0"/>
+          <a:ext cx="0" cy="0"/>
+          <a:chOff x="0" y="0"/>
+          <a:chExt cx="0" cy="0"/>
+        </a:xfrm>
+      </p:grpSpPr>
+      <p:pic>
+        <p:nvPicPr>
+          <p:cNvPr id="2" name="Picture 1"/>
+          <p:cNvPicPr>
+            <a:picLocks noChangeAspect="1"/>
+          </p:cNvPicPr>
+          <p:nvPr/>
+        </p:nvPicPr>
+        <p:blipFill>
+          <a:blip r:embed="rId2"/>
+          <a:stretch>
+            <a:fillRect/>
+          </a:stretch>
+        </p:blipFill>
+        <p:spPr>
+          <a:xfrm>
+            <a:off x="-187325" y="-39688"/>
+            <a:ext cx="13011150" cy="7315200"/>
+          </a:xfrm>
+          <a:prstGeom prst="rect">
+            <a:avLst/>
+          </a:prstGeom>
+        </p:spPr>
+      </p:pic>
+      <p:pic>
+        <p:nvPicPr>
+          <p:cNvPr id="3" name="Picture 2"/>
+          <p:cNvPicPr>
+            <a:picLocks noChangeAspect="1"/>
+          </p:cNvPicPr>
+          <p:nvPr/>
+        </p:nvPicPr>
+        <p:blipFill>
+          <a:blip r:embed="rId3"/>
+          <a:stretch>
+            <a:fillRect/>
+          </a:stretch>
+        </p:blipFill>
+        <p:spPr>
+          <a:xfrm>
+            <a:off x="2699040" y="2840482"/>
+            <a:ext cx="8640381" cy="4267796"/>
+          </a:xfrm>
+          <a:prstGeom prst="rect">
+            <a:avLst/>
+          </a:prstGeom>
+        </p:spPr>
+      </p:pic>
+    </p:spTree>
+    <p:extLst>
+      <p:ext uri="{BB962C8B-B14F-4D97-AF65-F5344CB8AC3E}">
+        <p14:creationId xmlns:p14="http://schemas.microsoft.com/office/powerpoint/2010/main" val="3026434620"/>
+      </p:ext>
+    </p:extLst>
+  </p:cSld>
+  <p:clrMapOvr>
+    <a:masterClrMapping/>
+  </p:clrMapOvr>
+</p:sld>
+</file>
+
 <file path=ppt/theme/theme1.xml><?xml version="1.0" encoding="utf-8"?>
 <a:theme xmlns:a="http://schemas.openxmlformats.org/drawingml/2006/main" name="Office Theme">
   <a:themeElements>

</xml_diff>